<commit_message>
update Er. tag is multivalue .
</commit_message>
<xml_diff>
--- a/ER diagtam.pptx
+++ b/ER diagtam.pptx
@@ -243,7 +243,7 @@
           <a:p>
             <a:fld id="{6EA3F631-6EF7-4536-84AA-348B1ACFFD25}" type="datetimeFigureOut">
               <a:rPr lang="en-US" smtClean="0"/>
-              <a:t>5/26/2019</a:t>
+              <a:t>6/1/2019</a:t>
             </a:fld>
             <a:endParaRPr lang="en-US"/>
           </a:p>
@@ -413,7 +413,7 @@
           <a:p>
             <a:fld id="{6EA3F631-6EF7-4536-84AA-348B1ACFFD25}" type="datetimeFigureOut">
               <a:rPr lang="en-US" smtClean="0"/>
-              <a:t>5/26/2019</a:t>
+              <a:t>6/1/2019</a:t>
             </a:fld>
             <a:endParaRPr lang="en-US"/>
           </a:p>
@@ -593,7 +593,7 @@
           <a:p>
             <a:fld id="{6EA3F631-6EF7-4536-84AA-348B1ACFFD25}" type="datetimeFigureOut">
               <a:rPr lang="en-US" smtClean="0"/>
-              <a:t>5/26/2019</a:t>
+              <a:t>6/1/2019</a:t>
             </a:fld>
             <a:endParaRPr lang="en-US"/>
           </a:p>
@@ -745,7 +745,7 @@
           <a:p>
             <a:fld id="{6EA3F631-6EF7-4536-84AA-348B1ACFFD25}" type="datetimeFigureOut">
               <a:rPr lang="en-US" smtClean="0"/>
-              <a:t>5/26/2019</a:t>
+              <a:t>6/1/2019</a:t>
             </a:fld>
             <a:endParaRPr lang="en-US"/>
           </a:p>
@@ -915,7 +915,7 @@
           <a:p>
             <a:fld id="{6EA3F631-6EF7-4536-84AA-348B1ACFFD25}" type="datetimeFigureOut">
               <a:rPr lang="en-US" smtClean="0"/>
-              <a:t>5/26/2019</a:t>
+              <a:t>6/1/2019</a:t>
             </a:fld>
             <a:endParaRPr lang="en-US"/>
           </a:p>
@@ -1161,7 +1161,7 @@
           <a:p>
             <a:fld id="{6EA3F631-6EF7-4536-84AA-348B1ACFFD25}" type="datetimeFigureOut">
               <a:rPr lang="en-US" smtClean="0"/>
-              <a:t>5/26/2019</a:t>
+              <a:t>6/1/2019</a:t>
             </a:fld>
             <a:endParaRPr lang="en-US"/>
           </a:p>
@@ -1393,7 +1393,7 @@
           <a:p>
             <a:fld id="{6EA3F631-6EF7-4536-84AA-348B1ACFFD25}" type="datetimeFigureOut">
               <a:rPr lang="en-US" smtClean="0"/>
-              <a:t>5/26/2019</a:t>
+              <a:t>6/1/2019</a:t>
             </a:fld>
             <a:endParaRPr lang="en-US"/>
           </a:p>
@@ -1760,7 +1760,7 @@
           <a:p>
             <a:fld id="{6EA3F631-6EF7-4536-84AA-348B1ACFFD25}" type="datetimeFigureOut">
               <a:rPr lang="en-US" smtClean="0"/>
-              <a:t>5/26/2019</a:t>
+              <a:t>6/1/2019</a:t>
             </a:fld>
             <a:endParaRPr lang="en-US"/>
           </a:p>
@@ -1878,7 +1878,7 @@
           <a:p>
             <a:fld id="{6EA3F631-6EF7-4536-84AA-348B1ACFFD25}" type="datetimeFigureOut">
               <a:rPr lang="en-US" smtClean="0"/>
-              <a:t>5/26/2019</a:t>
+              <a:t>6/1/2019</a:t>
             </a:fld>
             <a:endParaRPr lang="en-US"/>
           </a:p>
@@ -1973,7 +1973,7 @@
           <a:p>
             <a:fld id="{6EA3F631-6EF7-4536-84AA-348B1ACFFD25}" type="datetimeFigureOut">
               <a:rPr lang="en-US" smtClean="0"/>
-              <a:t>5/26/2019</a:t>
+              <a:t>6/1/2019</a:t>
             </a:fld>
             <a:endParaRPr lang="en-US"/>
           </a:p>
@@ -2250,7 +2250,7 @@
           <a:p>
             <a:fld id="{6EA3F631-6EF7-4536-84AA-348B1ACFFD25}" type="datetimeFigureOut">
               <a:rPr lang="en-US" smtClean="0"/>
-              <a:t>5/26/2019</a:t>
+              <a:t>6/1/2019</a:t>
             </a:fld>
             <a:endParaRPr lang="en-US"/>
           </a:p>
@@ -2503,7 +2503,7 @@
           <a:p>
             <a:fld id="{6EA3F631-6EF7-4536-84AA-348B1ACFFD25}" type="datetimeFigureOut">
               <a:rPr lang="en-US" smtClean="0"/>
-              <a:t>5/26/2019</a:t>
+              <a:t>6/1/2019</a:t>
             </a:fld>
             <a:endParaRPr lang="en-US"/>
           </a:p>
@@ -2716,7 +2716,7 @@
           <a:p>
             <a:fld id="{6EA3F631-6EF7-4536-84AA-348B1ACFFD25}" type="datetimeFigureOut">
               <a:rPr lang="en-US" smtClean="0"/>
-              <a:t>5/26/2019</a:t>
+              <a:t>6/1/2019</a:t>
             </a:fld>
             <a:endParaRPr lang="en-US"/>
           </a:p>
@@ -3124,6 +3124,45 @@
       </p:grpSpPr>
       <p:sp>
         <p:nvSpPr>
+          <p:cNvPr id="80" name="Oval 79"/>
+          <p:cNvSpPr/>
+          <p:nvPr/>
+        </p:nvSpPr>
+        <p:spPr>
+          <a:xfrm>
+            <a:off x="2040903" y="4693920"/>
+            <a:ext cx="875652" cy="566738"/>
+          </a:xfrm>
+          <a:prstGeom prst="ellipse">
+            <a:avLst/>
+          </a:prstGeom>
+          <a:ln/>
+        </p:spPr>
+        <p:style>
+          <a:lnRef idx="2">
+            <a:schemeClr val="dk1"/>
+          </a:lnRef>
+          <a:fillRef idx="1">
+            <a:schemeClr val="lt1"/>
+          </a:fillRef>
+          <a:effectRef idx="0">
+            <a:schemeClr val="dk1"/>
+          </a:effectRef>
+          <a:fontRef idx="minor">
+            <a:schemeClr val="dk1"/>
+          </a:fontRef>
+        </p:style>
+        <p:txBody>
+          <a:bodyPr rtlCol="0" anchor="ctr"/>
+          <a:lstStyle/>
+          <a:p>
+            <a:pPr algn="ctr"/>
+            <a:endParaRPr lang="en-US" sz="1200" dirty="0" smtClean="0"/>
+          </a:p>
+        </p:txBody>
+      </p:sp>
+      <p:sp>
+        <p:nvSpPr>
           <p:cNvPr id="3" name="Rounded Rectangle 2"/>
           <p:cNvSpPr/>
           <p:nvPr/>
@@ -3574,7 +3613,7 @@
         </p:nvSpPr>
         <p:spPr>
           <a:xfrm>
-            <a:off x="7358377" y="1852771"/>
+            <a:off x="7350671" y="2221154"/>
             <a:ext cx="787803" cy="474603"/>
           </a:xfrm>
           <a:prstGeom prst="ellipse">
@@ -3652,18 +3691,23 @@
       </p:sp>
       <p:sp>
         <p:nvSpPr>
-          <p:cNvPr id="19" name="Oval 18"/>
+          <p:cNvPr id="20" name="Oval 19"/>
           <p:cNvSpPr/>
           <p:nvPr/>
         </p:nvSpPr>
         <p:spPr>
           <a:xfrm>
-            <a:off x="7343511" y="4762111"/>
+            <a:off x="2086772" y="4739513"/>
             <a:ext cx="787803" cy="474603"/>
           </a:xfrm>
           <a:prstGeom prst="ellipse">
             <a:avLst/>
           </a:prstGeom>
+          <a:ln>
+            <a:solidFill>
+              <a:schemeClr val="tx1"/>
+            </a:solidFill>
+          </a:ln>
         </p:spPr>
         <p:style>
           <a:lnRef idx="1">
@@ -3685,52 +3729,13 @@
           <a:p>
             <a:pPr algn="ctr"/>
             <a:r>
+              <a:rPr lang="en-US" sz="1200" dirty="0"/>
+              <a:t>t</a:t>
+            </a:r>
+            <a:r>
               <a:rPr lang="en-US" sz="1200" dirty="0" smtClean="0"/>
-              <a:t>type</a:t>
-            </a:r>
-            <a:endParaRPr lang="en-US" sz="1200" dirty="0"/>
-          </a:p>
-        </p:txBody>
-      </p:sp>
-      <p:sp>
-        <p:nvSpPr>
-          <p:cNvPr id="20" name="Oval 19"/>
-          <p:cNvSpPr/>
-          <p:nvPr/>
-        </p:nvSpPr>
-        <p:spPr>
-          <a:xfrm>
-            <a:off x="1348027" y="4916547"/>
-            <a:ext cx="787803" cy="474603"/>
-          </a:xfrm>
-          <a:prstGeom prst="ellipse">
-            <a:avLst/>
-          </a:prstGeom>
-        </p:spPr>
-        <p:style>
-          <a:lnRef idx="1">
-            <a:schemeClr val="accent1"/>
-          </a:lnRef>
-          <a:fillRef idx="2">
-            <a:schemeClr val="accent1"/>
-          </a:fillRef>
-          <a:effectRef idx="1">
-            <a:schemeClr val="accent1"/>
-          </a:effectRef>
-          <a:fontRef idx="minor">
-            <a:schemeClr val="dk1"/>
-          </a:fontRef>
-        </p:style>
-        <p:txBody>
-          <a:bodyPr rtlCol="0" anchor="ctr"/>
-          <a:lstStyle/>
-          <a:p>
-            <a:pPr algn="ctr"/>
-            <a:r>
-              <a:rPr lang="en-US" sz="1200" dirty="0" smtClean="0"/>
-              <a:t>name</a:t>
-            </a:r>
-            <a:endParaRPr lang="en-US" sz="1200" dirty="0"/>
+              <a:t>ag</a:t>
+            </a:r>
           </a:p>
         </p:txBody>
       </p:sp>
@@ -3742,7 +3747,7 @@
         </p:nvSpPr>
         <p:spPr>
           <a:xfrm>
-            <a:off x="2569803" y="4739513"/>
+            <a:off x="3232272" y="5705760"/>
             <a:ext cx="1023120" cy="474603"/>
           </a:xfrm>
           <a:prstGeom prst="ellipse">
@@ -4047,8 +4052,8 @@
         </p:nvCxnSpPr>
         <p:spPr>
           <a:xfrm flipH="1">
-            <a:off x="6754827" y="2090073"/>
-            <a:ext cx="603550" cy="429811"/>
+            <a:off x="6754827" y="2458456"/>
+            <a:ext cx="595844" cy="61428"/>
           </a:xfrm>
           <a:prstGeom prst="line">
             <a:avLst/>
@@ -4074,14 +4079,14 @@
           <p:cNvPr id="53" name="Straight Connector 52"/>
           <p:cNvCxnSpPr>
             <a:stCxn id="6" idx="2"/>
-            <a:endCxn id="19" idx="0"/>
+            <a:endCxn id="91" idx="1"/>
           </p:cNvCxnSpPr>
           <p:nvPr/>
         </p:nvCxnSpPr>
         <p:spPr>
           <a:xfrm>
             <a:off x="6693830" y="4404278"/>
-            <a:ext cx="1043582" cy="357833"/>
+            <a:ext cx="878127" cy="372639"/>
           </a:xfrm>
           <a:prstGeom prst="line">
             <a:avLst/>
@@ -4180,7 +4185,7 @@
         <p:spPr>
           <a:xfrm>
             <a:off x="1741928" y="4404278"/>
-            <a:ext cx="0" cy="512270"/>
+            <a:ext cx="738746" cy="335235"/>
           </a:xfrm>
           <a:prstGeom prst="line">
             <a:avLst/>
@@ -4238,15 +4243,15 @@
         <p:nvCxnSpPr>
           <p:cNvPr id="73" name="Straight Connector 72"/>
           <p:cNvCxnSpPr>
-            <a:stCxn id="3" idx="2"/>
+            <a:stCxn id="20" idx="5"/>
             <a:endCxn id="21" idx="1"/>
           </p:cNvCxnSpPr>
           <p:nvPr/>
         </p:nvCxnSpPr>
         <p:spPr>
           <a:xfrm>
-            <a:off x="1741928" y="4404278"/>
-            <a:ext cx="977708" cy="404739"/>
+            <a:off x="2759204" y="5144612"/>
+            <a:ext cx="622900" cy="630652"/>
           </a:xfrm>
           <a:prstGeom prst="line">
             <a:avLst/>
@@ -4644,64 +4649,19 @@
           </a:p>
         </p:txBody>
       </p:sp>
-      <p:sp>
-        <p:nvSpPr>
-          <p:cNvPr id="45" name="Oval 44"/>
-          <p:cNvSpPr/>
-          <p:nvPr/>
-        </p:nvSpPr>
-        <p:spPr>
-          <a:xfrm>
-            <a:off x="1937765" y="178679"/>
-            <a:ext cx="787803" cy="474603"/>
-          </a:xfrm>
-          <a:prstGeom prst="ellipse">
-            <a:avLst/>
-          </a:prstGeom>
-        </p:spPr>
-        <p:style>
-          <a:lnRef idx="1">
-            <a:schemeClr val="accent1"/>
-          </a:lnRef>
-          <a:fillRef idx="2">
-            <a:schemeClr val="accent1"/>
-          </a:fillRef>
-          <a:effectRef idx="1">
-            <a:schemeClr val="accent1"/>
-          </a:effectRef>
-          <a:fontRef idx="minor">
-            <a:schemeClr val="dk1"/>
-          </a:fontRef>
-        </p:style>
-        <p:txBody>
-          <a:bodyPr rtlCol="0" anchor="ctr"/>
-          <a:lstStyle/>
-          <a:p>
-            <a:pPr algn="ctr"/>
-            <a:r>
-              <a:rPr lang="en-US" sz="1200" dirty="0"/>
-              <a:t>t</a:t>
-            </a:r>
-            <a:r>
-              <a:rPr lang="en-US" sz="1200" dirty="0" smtClean="0"/>
-              <a:t>ag</a:t>
-            </a:r>
-          </a:p>
-        </p:txBody>
-      </p:sp>
       <p:cxnSp>
         <p:nvCxnSpPr>
           <p:cNvPr id="47" name="Straight Connector 46"/>
           <p:cNvCxnSpPr>
-            <a:stCxn id="45" idx="5"/>
+            <a:stCxn id="87" idx="5"/>
             <a:endCxn id="4" idx="0"/>
           </p:cNvCxnSpPr>
           <p:nvPr/>
         </p:nvCxnSpPr>
         <p:spPr>
           <a:xfrm>
-            <a:off x="2610197" y="583778"/>
-            <a:ext cx="1645196" cy="340082"/>
+            <a:off x="2524580" y="573812"/>
+            <a:ext cx="1730813" cy="350048"/>
           </a:xfrm>
           <a:prstGeom prst="line">
             <a:avLst/>
@@ -4805,7 +4765,7 @@
         </p:nvSpPr>
         <p:spPr>
           <a:xfrm>
-            <a:off x="9312328" y="4739512"/>
+            <a:off x="9200465" y="4762111"/>
             <a:ext cx="1284448" cy="474603"/>
           </a:xfrm>
           <a:prstGeom prst="ellipse">
@@ -4925,8 +4885,8 @@
         </p:nvCxnSpPr>
         <p:spPr>
           <a:xfrm flipH="1">
-            <a:off x="9954552" y="4215932"/>
-            <a:ext cx="763952" cy="523580"/>
+            <a:off x="9842689" y="4215932"/>
+            <a:ext cx="875815" cy="546179"/>
           </a:xfrm>
           <a:prstGeom prst="line">
             <a:avLst/>
@@ -4988,7 +4948,7 @@
         </p:nvSpPr>
         <p:spPr>
           <a:xfrm>
-            <a:off x="10336528" y="1852770"/>
+            <a:off x="11078386" y="1622191"/>
             <a:ext cx="787803" cy="474603"/>
           </a:xfrm>
           <a:prstGeom prst="ellipse">
@@ -5034,7 +4994,7 @@
         <p:spPr>
           <a:xfrm flipH="1" flipV="1">
             <a:off x="10719777" y="1134068"/>
-            <a:ext cx="10653" cy="718702"/>
+            <a:ext cx="752511" cy="488123"/>
           </a:xfrm>
           <a:prstGeom prst="line">
             <a:avLst/>
@@ -5123,7 +5083,7 @@
         </p:nvSpPr>
         <p:spPr>
           <a:xfrm>
-            <a:off x="8068054" y="1276877"/>
+            <a:off x="7571957" y="1377464"/>
             <a:ext cx="787803" cy="474603"/>
           </a:xfrm>
           <a:prstGeom prst="ellipse">
@@ -5162,14 +5122,14 @@
           <p:cNvPr id="104" name="Straight Connector 103"/>
           <p:cNvCxnSpPr>
             <a:stCxn id="102" idx="2"/>
-            <a:endCxn id="103" idx="1"/>
+            <a:endCxn id="103" idx="0"/>
           </p:cNvCxnSpPr>
           <p:nvPr/>
         </p:nvCxnSpPr>
         <p:spPr>
           <a:xfrm>
             <a:off x="7752280" y="1142103"/>
-            <a:ext cx="431145" cy="204278"/>
+            <a:ext cx="213579" cy="235361"/>
           </a:xfrm>
           <a:prstGeom prst="line">
             <a:avLst/>
@@ -5190,6 +5150,333 @@
           </a:fontRef>
         </p:style>
       </p:cxnSp>
+      <p:sp>
+        <p:nvSpPr>
+          <p:cNvPr id="60" name="Oval 59"/>
+          <p:cNvSpPr/>
+          <p:nvPr/>
+        </p:nvSpPr>
+        <p:spPr>
+          <a:xfrm>
+            <a:off x="9522122" y="1622191"/>
+            <a:ext cx="787803" cy="474603"/>
+          </a:xfrm>
+          <a:prstGeom prst="ellipse">
+            <a:avLst/>
+          </a:prstGeom>
+        </p:spPr>
+        <p:style>
+          <a:lnRef idx="1">
+            <a:schemeClr val="accent1"/>
+          </a:lnRef>
+          <a:fillRef idx="2">
+            <a:schemeClr val="accent1"/>
+          </a:fillRef>
+          <a:effectRef idx="1">
+            <a:schemeClr val="accent1"/>
+          </a:effectRef>
+          <a:fontRef idx="minor">
+            <a:schemeClr val="dk1"/>
+          </a:fontRef>
+        </p:style>
+        <p:txBody>
+          <a:bodyPr rtlCol="0" anchor="ctr"/>
+          <a:lstStyle/>
+          <a:p>
+            <a:pPr algn="ctr"/>
+            <a:r>
+              <a:rPr lang="en-US" sz="1200" u="sng" dirty="0" smtClean="0"/>
+              <a:t>id</a:t>
+            </a:r>
+            <a:endParaRPr lang="en-US" sz="1200" u="sng" dirty="0"/>
+          </a:p>
+        </p:txBody>
+      </p:sp>
+      <p:cxnSp>
+        <p:nvCxnSpPr>
+          <p:cNvPr id="61" name="Straight Connector 60"/>
+          <p:cNvCxnSpPr>
+            <a:stCxn id="60" idx="0"/>
+          </p:cNvCxnSpPr>
+          <p:nvPr/>
+        </p:nvCxnSpPr>
+        <p:spPr>
+          <a:xfrm flipV="1">
+            <a:off x="9916024" y="1133224"/>
+            <a:ext cx="817130" cy="488967"/>
+          </a:xfrm>
+          <a:prstGeom prst="line">
+            <a:avLst/>
+          </a:prstGeom>
+        </p:spPr>
+        <p:style>
+          <a:lnRef idx="3">
+            <a:schemeClr val="dk1"/>
+          </a:lnRef>
+          <a:fillRef idx="0">
+            <a:schemeClr val="dk1"/>
+          </a:fillRef>
+          <a:effectRef idx="2">
+            <a:schemeClr val="dk1"/>
+          </a:effectRef>
+          <a:fontRef idx="minor">
+            <a:schemeClr val="tx1"/>
+          </a:fontRef>
+        </p:style>
+      </p:cxnSp>
+      <p:sp>
+        <p:nvSpPr>
+          <p:cNvPr id="69" name="Oval 68"/>
+          <p:cNvSpPr/>
+          <p:nvPr/>
+        </p:nvSpPr>
+        <p:spPr>
+          <a:xfrm>
+            <a:off x="1133172" y="5705760"/>
+            <a:ext cx="1023120" cy="474603"/>
+          </a:xfrm>
+          <a:prstGeom prst="ellipse">
+            <a:avLst/>
+          </a:prstGeom>
+        </p:spPr>
+        <p:style>
+          <a:lnRef idx="1">
+            <a:schemeClr val="accent1"/>
+          </a:lnRef>
+          <a:fillRef idx="2">
+            <a:schemeClr val="accent1"/>
+          </a:fillRef>
+          <a:effectRef idx="1">
+            <a:schemeClr val="accent1"/>
+          </a:effectRef>
+          <a:fontRef idx="minor">
+            <a:schemeClr val="dk1"/>
+          </a:fontRef>
+        </p:style>
+        <p:txBody>
+          <a:bodyPr rtlCol="0" anchor="ctr"/>
+          <a:lstStyle/>
+          <a:p>
+            <a:pPr algn="ctr"/>
+            <a:r>
+              <a:rPr lang="en-US" sz="1200" dirty="0" smtClean="0"/>
+              <a:t>name</a:t>
+            </a:r>
+            <a:endParaRPr lang="en-US" sz="1200" dirty="0"/>
+          </a:p>
+        </p:txBody>
+      </p:sp>
+      <p:cxnSp>
+        <p:nvCxnSpPr>
+          <p:cNvPr id="70" name="Straight Connector 69"/>
+          <p:cNvCxnSpPr>
+            <a:stCxn id="20" idx="3"/>
+            <a:endCxn id="69" idx="0"/>
+          </p:cNvCxnSpPr>
+          <p:nvPr/>
+        </p:nvCxnSpPr>
+        <p:spPr>
+          <a:xfrm flipH="1">
+            <a:off x="1644732" y="5144612"/>
+            <a:ext cx="557411" cy="561148"/>
+          </a:xfrm>
+          <a:prstGeom prst="line">
+            <a:avLst/>
+          </a:prstGeom>
+        </p:spPr>
+        <p:style>
+          <a:lnRef idx="3">
+            <a:schemeClr val="dk1"/>
+          </a:lnRef>
+          <a:fillRef idx="0">
+            <a:schemeClr val="dk1"/>
+          </a:fillRef>
+          <a:effectRef idx="2">
+            <a:schemeClr val="dk1"/>
+          </a:effectRef>
+          <a:fontRef idx="minor">
+            <a:schemeClr val="tx1"/>
+          </a:fontRef>
+        </p:style>
+      </p:cxnSp>
+      <p:sp>
+        <p:nvSpPr>
+          <p:cNvPr id="86" name="Oval 85"/>
+          <p:cNvSpPr/>
+          <p:nvPr/>
+        </p:nvSpPr>
+        <p:spPr>
+          <a:xfrm>
+            <a:off x="1806279" y="123120"/>
+            <a:ext cx="875652" cy="566738"/>
+          </a:xfrm>
+          <a:prstGeom prst="ellipse">
+            <a:avLst/>
+          </a:prstGeom>
+          <a:ln/>
+        </p:spPr>
+        <p:style>
+          <a:lnRef idx="2">
+            <a:schemeClr val="dk1"/>
+          </a:lnRef>
+          <a:fillRef idx="1">
+            <a:schemeClr val="lt1"/>
+          </a:fillRef>
+          <a:effectRef idx="0">
+            <a:schemeClr val="dk1"/>
+          </a:effectRef>
+          <a:fontRef idx="minor">
+            <a:schemeClr val="dk1"/>
+          </a:fontRef>
+        </p:style>
+        <p:txBody>
+          <a:bodyPr rtlCol="0" anchor="ctr"/>
+          <a:lstStyle/>
+          <a:p>
+            <a:pPr algn="ctr"/>
+            <a:endParaRPr lang="en-US" sz="1200" dirty="0" smtClean="0"/>
+          </a:p>
+        </p:txBody>
+      </p:sp>
+      <p:sp>
+        <p:nvSpPr>
+          <p:cNvPr id="87" name="Oval 86"/>
+          <p:cNvSpPr/>
+          <p:nvPr/>
+        </p:nvSpPr>
+        <p:spPr>
+          <a:xfrm>
+            <a:off x="1852148" y="168713"/>
+            <a:ext cx="787803" cy="474603"/>
+          </a:xfrm>
+          <a:prstGeom prst="ellipse">
+            <a:avLst/>
+          </a:prstGeom>
+          <a:ln>
+            <a:solidFill>
+              <a:schemeClr val="tx1"/>
+            </a:solidFill>
+          </a:ln>
+        </p:spPr>
+        <p:style>
+          <a:lnRef idx="1">
+            <a:schemeClr val="accent1"/>
+          </a:lnRef>
+          <a:fillRef idx="2">
+            <a:schemeClr val="accent1"/>
+          </a:fillRef>
+          <a:effectRef idx="1">
+            <a:schemeClr val="accent1"/>
+          </a:effectRef>
+          <a:fontRef idx="minor">
+            <a:schemeClr val="dk1"/>
+          </a:fontRef>
+        </p:style>
+        <p:txBody>
+          <a:bodyPr rtlCol="0" anchor="ctr"/>
+          <a:lstStyle/>
+          <a:p>
+            <a:pPr algn="ctr"/>
+            <a:r>
+              <a:rPr lang="en-US" sz="1200" dirty="0"/>
+              <a:t>t</a:t>
+            </a:r>
+            <a:r>
+              <a:rPr lang="en-US" sz="1200" dirty="0" smtClean="0"/>
+              <a:t>ag</a:t>
+            </a:r>
+          </a:p>
+        </p:txBody>
+      </p:sp>
+      <p:sp>
+        <p:nvSpPr>
+          <p:cNvPr id="91" name="Oval 90"/>
+          <p:cNvSpPr/>
+          <p:nvPr/>
+        </p:nvSpPr>
+        <p:spPr>
+          <a:xfrm>
+            <a:off x="7443721" y="4693920"/>
+            <a:ext cx="875652" cy="566738"/>
+          </a:xfrm>
+          <a:prstGeom prst="ellipse">
+            <a:avLst/>
+          </a:prstGeom>
+          <a:ln/>
+        </p:spPr>
+        <p:style>
+          <a:lnRef idx="2">
+            <a:schemeClr val="dk1"/>
+          </a:lnRef>
+          <a:fillRef idx="1">
+            <a:schemeClr val="lt1"/>
+          </a:fillRef>
+          <a:effectRef idx="0">
+            <a:schemeClr val="dk1"/>
+          </a:effectRef>
+          <a:fontRef idx="minor">
+            <a:schemeClr val="dk1"/>
+          </a:fontRef>
+        </p:style>
+        <p:txBody>
+          <a:bodyPr rtlCol="0" anchor="ctr"/>
+          <a:lstStyle/>
+          <a:p>
+            <a:pPr algn="ctr"/>
+            <a:endParaRPr lang="en-US" sz="1200" dirty="0" smtClean="0"/>
+          </a:p>
+        </p:txBody>
+      </p:sp>
+      <p:sp>
+        <p:nvSpPr>
+          <p:cNvPr id="94" name="Oval 93"/>
+          <p:cNvSpPr/>
+          <p:nvPr/>
+        </p:nvSpPr>
+        <p:spPr>
+          <a:xfrm>
+            <a:off x="7489590" y="4739513"/>
+            <a:ext cx="787803" cy="474603"/>
+          </a:xfrm>
+          <a:prstGeom prst="ellipse">
+            <a:avLst/>
+          </a:prstGeom>
+          <a:ln>
+            <a:solidFill>
+              <a:schemeClr val="tx1"/>
+            </a:solidFill>
+          </a:ln>
+        </p:spPr>
+        <p:style>
+          <a:lnRef idx="1">
+            <a:schemeClr val="accent1"/>
+          </a:lnRef>
+          <a:fillRef idx="2">
+            <a:schemeClr val="accent1"/>
+          </a:fillRef>
+          <a:effectRef idx="1">
+            <a:schemeClr val="accent1"/>
+          </a:effectRef>
+          <a:fontRef idx="minor">
+            <a:schemeClr val="dk1"/>
+          </a:fontRef>
+        </p:style>
+        <p:txBody>
+          <a:bodyPr rtlCol="0" anchor="ctr"/>
+          <a:lstStyle/>
+          <a:p>
+            <a:pPr algn="ctr"/>
+            <a:r>
+              <a:rPr lang="en-US" sz="1200" dirty="0"/>
+              <a:t>t</a:t>
+            </a:r>
+            <a:r>
+              <a:rPr lang="en-US" sz="1200" dirty="0" smtClean="0"/>
+              <a:t>ag</a:t>
+            </a:r>
+          </a:p>
+        </p:txBody>
+      </p:sp>
     </p:spTree>
     <p:extLst>
       <p:ext uri="{BB962C8B-B14F-4D97-AF65-F5344CB8AC3E}">

</xml_diff>